<commit_message>
Think I updated the PowerPoint?
</commit_message>
<xml_diff>
--- a/6022_Phys_2_(2025)/Day2Day/W01/6022_W25_W01D01_Course_Intro_Dynamic_Intersections.pptx.pptx
+++ b/6022_Phys_2_(2025)/Day2Day/W01/6022_W25_W01D01_Course_Intro_Dynamic_Intersections.pptx.pptx
@@ -129,6 +129,11 @@
       </a:defRPr>
     </a:lvl9pPr>
   </p:defaultTextStyle>
+  <p:extLst>
+    <p:ext uri="{EFAFB233-063F-42B5-8137-9DF3F51BA10A}">
+      <p15:sldGuideLst xmlns:p15="http://schemas.microsoft.com/office/powerpoint/2012/main"/>
+    </p:ext>
+  </p:extLst>
 </p:presentation>
 </file>
 
@@ -6463,7 +6468,7 @@
         </p:nvSpPr>
         <p:spPr>
           <a:xfrm>
-            <a:off x="2819400" y="1981200"/>
+            <a:off x="2673096" y="1585551"/>
             <a:ext cx="6477000" cy="3124200"/>
           </a:xfrm>
         </p:spPr>
@@ -6549,7 +6554,7 @@
         </p:nvSpPr>
         <p:spPr bwMode="auto">
           <a:xfrm>
-            <a:off x="3962400" y="4352330"/>
+            <a:off x="2523744" y="4335334"/>
             <a:ext cx="6324600" cy="1447800"/>
           </a:xfrm>
           <a:prstGeom prst="rect">
@@ -6642,7 +6647,7 @@
         </p:nvSpPr>
         <p:spPr>
           <a:xfrm>
-            <a:off x="8010144" y="2658934"/>
+            <a:off x="7918704" y="2246288"/>
             <a:ext cx="838200" cy="1015663"/>
           </a:xfrm>
           <a:prstGeom prst="rect">

</xml_diff>